<commit_message>
Amend read storage sequence diagram
</commit_message>
<xml_diff>
--- a/docs/diagrams/ReadStorageSequenceDiagram.pptx
+++ b/docs/diagrams/ReadStorageSequenceDiagram.pptx
@@ -208,7 +208,7 @@
           <a:p>
             <a:fld id="{F5CC4B3F-88C1-4FFA-B1B6-F41C21DC6924}" type="datetimeFigureOut">
               <a:rPr lang="en-US" smtClean="0"/>
-              <a:t>4/10/2018</a:t>
+              <a:t>4/14/2018</a:t>
             </a:fld>
             <a:endParaRPr lang="en-US"/>
           </a:p>
@@ -738,7 +738,7 @@
           <a:p>
             <a:fld id="{78C97017-6FC3-485B-9764-EAC9E56C1D49}" type="datetimeFigureOut">
               <a:rPr lang="en-US" smtClean="0"/>
-              <a:t>4/10/2018</a:t>
+              <a:t>4/14/2018</a:t>
             </a:fld>
             <a:endParaRPr lang="en-US"/>
           </a:p>
@@ -906,7 +906,7 @@
           <a:p>
             <a:fld id="{78C97017-6FC3-485B-9764-EAC9E56C1D49}" type="datetimeFigureOut">
               <a:rPr lang="en-US" smtClean="0"/>
-              <a:t>4/10/2018</a:t>
+              <a:t>4/14/2018</a:t>
             </a:fld>
             <a:endParaRPr lang="en-US"/>
           </a:p>
@@ -1084,7 +1084,7 @@
           <a:p>
             <a:fld id="{78C97017-6FC3-485B-9764-EAC9E56C1D49}" type="datetimeFigureOut">
               <a:rPr lang="en-US" smtClean="0"/>
-              <a:t>4/10/2018</a:t>
+              <a:t>4/14/2018</a:t>
             </a:fld>
             <a:endParaRPr lang="en-US"/>
           </a:p>
@@ -1252,7 +1252,7 @@
           <a:p>
             <a:fld id="{78C97017-6FC3-485B-9764-EAC9E56C1D49}" type="datetimeFigureOut">
               <a:rPr lang="en-US" smtClean="0"/>
-              <a:t>4/10/2018</a:t>
+              <a:t>4/14/2018</a:t>
             </a:fld>
             <a:endParaRPr lang="en-US"/>
           </a:p>
@@ -1497,7 +1497,7 @@
           <a:p>
             <a:fld id="{78C97017-6FC3-485B-9764-EAC9E56C1D49}" type="datetimeFigureOut">
               <a:rPr lang="en-US" smtClean="0"/>
-              <a:t>4/10/2018</a:t>
+              <a:t>4/14/2018</a:t>
             </a:fld>
             <a:endParaRPr lang="en-US"/>
           </a:p>
@@ -1782,7 +1782,7 @@
           <a:p>
             <a:fld id="{78C97017-6FC3-485B-9764-EAC9E56C1D49}" type="datetimeFigureOut">
               <a:rPr lang="en-US" smtClean="0"/>
-              <a:t>4/10/2018</a:t>
+              <a:t>4/14/2018</a:t>
             </a:fld>
             <a:endParaRPr lang="en-US"/>
           </a:p>
@@ -2201,7 +2201,7 @@
           <a:p>
             <a:fld id="{78C97017-6FC3-485B-9764-EAC9E56C1D49}" type="datetimeFigureOut">
               <a:rPr lang="en-US" smtClean="0"/>
-              <a:t>4/10/2018</a:t>
+              <a:t>4/14/2018</a:t>
             </a:fld>
             <a:endParaRPr lang="en-US"/>
           </a:p>
@@ -2318,7 +2318,7 @@
           <a:p>
             <a:fld id="{78C97017-6FC3-485B-9764-EAC9E56C1D49}" type="datetimeFigureOut">
               <a:rPr lang="en-US" smtClean="0"/>
-              <a:t>4/10/2018</a:t>
+              <a:t>4/14/2018</a:t>
             </a:fld>
             <a:endParaRPr lang="en-US"/>
           </a:p>
@@ -2413,7 +2413,7 @@
           <a:p>
             <a:fld id="{78C97017-6FC3-485B-9764-EAC9E56C1D49}" type="datetimeFigureOut">
               <a:rPr lang="en-US" smtClean="0"/>
-              <a:t>4/10/2018</a:t>
+              <a:t>4/14/2018</a:t>
             </a:fld>
             <a:endParaRPr lang="en-US"/>
           </a:p>
@@ -2688,7 +2688,7 @@
           <a:p>
             <a:fld id="{78C97017-6FC3-485B-9764-EAC9E56C1D49}" type="datetimeFigureOut">
               <a:rPr lang="en-US" smtClean="0"/>
-              <a:t>4/10/2018</a:t>
+              <a:t>4/14/2018</a:t>
             </a:fld>
             <a:endParaRPr lang="en-US"/>
           </a:p>
@@ -2940,7 +2940,7 @@
           <a:p>
             <a:fld id="{78C97017-6FC3-485B-9764-EAC9E56C1D49}" type="datetimeFigureOut">
               <a:rPr lang="en-US" smtClean="0"/>
-              <a:t>4/10/2018</a:t>
+              <a:t>4/14/2018</a:t>
             </a:fld>
             <a:endParaRPr lang="en-US"/>
           </a:p>
@@ -3151,7 +3151,7 @@
           <a:p>
             <a:fld id="{78C97017-6FC3-485B-9764-EAC9E56C1D49}" type="datetimeFigureOut">
               <a:rPr lang="en-US" smtClean="0"/>
-              <a:t>4/10/2018</a:t>
+              <a:t>4/14/2018</a:t>
             </a:fld>
             <a:endParaRPr lang="en-US"/>
           </a:p>
@@ -3570,10 +3570,14 @@
           <a:p>
             <a:pPr algn="ctr"/>
             <a:r>
-              <a:rPr lang="en-SG" dirty="0" err="1"/>
+              <a:rPr lang="en-SG" sz="1600" dirty="0"/>
+              <a:t>:</a:t>
+            </a:r>
+            <a:r>
+              <a:rPr lang="en-SG" sz="1600" dirty="0" err="1"/>
               <a:t>MainApp</a:t>
             </a:r>
-            <a:endParaRPr lang="en-SG" dirty="0"/>
+            <a:endParaRPr lang="en-SG" sz="1600" dirty="0"/>
           </a:p>
         </p:txBody>
       </p:sp>
@@ -3662,10 +3666,14 @@
           <a:p>
             <a:pPr algn="ctr"/>
             <a:r>
-              <a:rPr lang="en-SG" dirty="0" err="1"/>
+              <a:rPr lang="en-SG" sz="1600" dirty="0"/>
+              <a:t>:</a:t>
+            </a:r>
+            <a:r>
+              <a:rPr lang="en-SG" sz="1600" dirty="0" err="1"/>
               <a:t>StorageManager</a:t>
             </a:r>
-            <a:endParaRPr lang="en-SG" dirty="0"/>
+            <a:endParaRPr lang="en-SG" sz="1600" dirty="0"/>
           </a:p>
         </p:txBody>
       </p:sp>
@@ -4524,10 +4532,21 @@
           <a:p>
             <a:pPr algn="ctr"/>
             <a:r>
-              <a:rPr lang="en-SG" dirty="0" err="1"/>
-              <a:t>StorageCalendarStorage</a:t>
-            </a:r>
-            <a:endParaRPr lang="en-SG" dirty="0"/>
+              <a:rPr lang="en-SG" sz="1600" dirty="0"/>
+              <a:t>:</a:t>
+            </a:r>
+            <a:r>
+              <a:rPr lang="en-SG" sz="1600" dirty="0" err="1"/>
+              <a:t>StorageCalendar</a:t>
+            </a:r>
+            <a:endParaRPr lang="en-SG" sz="1600" dirty="0"/>
+          </a:p>
+          <a:p>
+            <a:pPr algn="ctr"/>
+            <a:r>
+              <a:rPr lang="en-SG" sz="1600" dirty="0"/>
+              <a:t>Storage</a:t>
+            </a:r>
           </a:p>
         </p:txBody>
       </p:sp>
@@ -5163,10 +5182,14 @@
             <a:p>
               <a:pPr algn="ctr"/>
               <a:r>
-                <a:rPr lang="en-SG" dirty="0" err="1"/>
-                <a:t>StorageManager</a:t>
+                <a:rPr lang="en-SG" sz="1600" dirty="0"/>
+                <a:t>:</a:t>
               </a:r>
-              <a:endParaRPr lang="en-SG" dirty="0"/>
+              <a:r>
+                <a:rPr lang="en-SG" sz="1600" dirty="0" err="1"/>
+                <a:t>ModelManager</a:t>
+              </a:r>
+              <a:endParaRPr lang="en-SG" sz="1600" dirty="0"/>
             </a:p>
           </p:txBody>
         </p:sp>
@@ -5263,6 +5286,54 @@
           </a:fontRef>
         </p:style>
       </p:cxnSp>
+      <p:sp>
+        <p:nvSpPr>
+          <p:cNvPr id="42" name="TextBox 41">
+            <a:extLst>
+              <a:ext uri="{FF2B5EF4-FFF2-40B4-BE49-F238E27FC236}">
+                <a16:creationId xmlns:a16="http://schemas.microsoft.com/office/drawing/2014/main" id="{120A6D6D-D4B1-4231-BF20-1D1FA5C1B546}"/>
+              </a:ext>
+            </a:extLst>
+          </p:cNvPr>
+          <p:cNvSpPr txBox="1"/>
+          <p:nvPr/>
+        </p:nvSpPr>
+        <p:spPr>
+          <a:xfrm>
+            <a:off x="2979204" y="4157990"/>
+            <a:ext cx="1156086" cy="261610"/>
+          </a:xfrm>
+          <a:prstGeom prst="rect">
+            <a:avLst/>
+          </a:prstGeom>
+          <a:noFill/>
+        </p:spPr>
+        <p:txBody>
+          <a:bodyPr wrap="none" rtlCol="0">
+            <a:spAutoFit/>
+          </a:bodyPr>
+          <a:lstStyle/>
+          <a:p>
+            <a:pPr algn="ctr"/>
+            <a:r>
+              <a:rPr lang="en-SG" sz="1100" dirty="0" err="1">
+                <a:solidFill>
+                  <a:schemeClr val="accent2"/>
+                </a:solidFill>
+              </a:rPr>
+              <a:t>ModelManager</a:t>
+            </a:r>
+            <a:r>
+              <a:rPr lang="en-SG" sz="1100" dirty="0">
+                <a:solidFill>
+                  <a:schemeClr val="accent2"/>
+                </a:solidFill>
+              </a:rPr>
+              <a:t>()</a:t>
+            </a:r>
+          </a:p>
+        </p:txBody>
+      </p:sp>
     </p:spTree>
     <p:extLst>
       <p:ext uri="{BB962C8B-B14F-4D97-AF65-F5344CB8AC3E}">

</xml_diff>